<commit_message>
Edited Innovative Features slide.
</commit_message>
<xml_diff>
--- a/Presentation/Vehicle Intersection Control Presentation.pptx
+++ b/Presentation/Vehicle Intersection Control Presentation.pptx
@@ -208,7 +208,7 @@
           <a:p>
             <a:fld id="{35B82655-F55E-45D4-839B-7F4274A77E35}" type="datetimeFigureOut">
               <a:rPr lang="en-US" smtClean="0"/>
-              <a:t>2/13/2017</a:t>
+              <a:t>2/14/2017</a:t>
             </a:fld>
             <a:endParaRPr lang="en-US"/>
           </a:p>
@@ -535,7 +535,7 @@
               <a:buNone/>
             </a:pPr>
             <a:r>
-              <a:rPr lang="en-CA" sz="2000" dirty="0" smtClean="0">
+              <a:rPr lang="en-CA" sz="2000" dirty="0">
                 <a:solidFill>
                   <a:schemeClr val="dk2"/>
                 </a:solidFill>
@@ -547,7 +547,7 @@
               <a:t>READER</a:t>
             </a:r>
             <a:r>
-              <a:rPr lang="en-CA" sz="2000" baseline="0" dirty="0" smtClean="0">
+              <a:rPr lang="en-CA" sz="2000" baseline="0" dirty="0">
                 <a:solidFill>
                   <a:schemeClr val="dk2"/>
                 </a:solidFill>
@@ -558,7 +558,7 @@
               </a:rPr>
               <a:t>: mat</a:t>
             </a:r>
-            <a:endParaRPr lang="en-CA" sz="2000" dirty="0" smtClean="0">
+            <a:endParaRPr lang="en-CA" sz="2000" dirty="0">
               <a:solidFill>
                 <a:schemeClr val="dk2"/>
               </a:solidFill>
@@ -582,7 +582,7 @@
               <a:buSzPct val="100000"/>
               <a:buChar char="-"/>
             </a:pPr>
-            <a:endParaRPr lang="en-CA" sz="2000" dirty="0" smtClean="0">
+            <a:endParaRPr lang="en-CA" sz="2000" dirty="0">
               <a:solidFill>
                 <a:schemeClr val="dk2"/>
               </a:solidFill>
@@ -607,18 +607,6 @@
               <a:buChar char="-"/>
             </a:pPr>
             <a:r>
-              <a:rPr lang="en-CA" sz="2000" dirty="0" smtClean="0">
-                <a:solidFill>
-                  <a:schemeClr val="dk2"/>
-                </a:solidFill>
-                <a:latin typeface="Cabin"/>
-                <a:ea typeface="Cabin"/>
-                <a:cs typeface="Cabin"/>
-                <a:sym typeface="Cabin"/>
-              </a:rPr>
-              <a:t>The </a:t>
-            </a:r>
-            <a:r>
               <a:rPr lang="en-CA" sz="2000" dirty="0">
                 <a:solidFill>
                   <a:schemeClr val="dk2"/>
@@ -628,7 +616,7 @@
                 <a:cs typeface="Cabin"/>
                 <a:sym typeface="Cabin"/>
               </a:rPr>
-              <a:t>problem : what to do when more than one vehicle arrives at the intersection at one time</a:t>
+              <a:t>The problem : what to do when more than one vehicle arrives at the intersection at one time</a:t>
             </a:r>
           </a:p>
           <a:p>
@@ -888,7 +876,7 @@
               <a:buNone/>
             </a:pPr>
             <a:r>
-              <a:rPr lang="en-CA" dirty="0" smtClean="0"/>
+              <a:rPr lang="en-CA" dirty="0"/>
               <a:t>READER: Mat</a:t>
             </a:r>
           </a:p>
@@ -900,12 +888,8 @@
               <a:buNone/>
             </a:pPr>
             <a:r>
-              <a:rPr lang="en-CA" dirty="0" smtClean="0"/>
-              <a:t>Slide </a:t>
-            </a:r>
-            <a:r>
               <a:rPr lang="en-CA" dirty="0"/>
-              <a:t>for explaining overall system</a:t>
+              <a:t>Slide for explaining overall system</a:t>
             </a:r>
           </a:p>
           <a:p>
@@ -1053,7 +1037,7 @@
               <a:buNone/>
             </a:pPr>
             <a:r>
-              <a:rPr lang="en-CA" sz="1100" dirty="0" smtClean="0">
+              <a:rPr lang="en-CA" sz="1100" dirty="0">
                 <a:solidFill>
                   <a:schemeClr val="dk1"/>
                 </a:solidFill>
@@ -1077,7 +1061,7 @@
               <a:buFont typeface="Cabin"/>
               <a:buChar char="●"/>
             </a:pPr>
-            <a:endParaRPr lang="en-CA" sz="1100" dirty="0" smtClean="0">
+            <a:endParaRPr lang="en-CA" sz="1100" dirty="0">
               <a:solidFill>
                 <a:schemeClr val="dk1"/>
               </a:solidFill>
@@ -1100,18 +1084,6 @@
               <a:buChar char="●"/>
             </a:pPr>
             <a:r>
-              <a:rPr lang="en-CA" sz="1100" dirty="0" smtClean="0">
-                <a:solidFill>
-                  <a:schemeClr val="dk1"/>
-                </a:solidFill>
-                <a:latin typeface="Cabin"/>
-                <a:ea typeface="Cabin"/>
-                <a:cs typeface="Cabin"/>
-                <a:sym typeface="Cabin"/>
-              </a:rPr>
-              <a:t>WHY </a:t>
-            </a:r>
-            <a:r>
               <a:rPr lang="en-CA" sz="1100" dirty="0">
                 <a:solidFill>
                   <a:schemeClr val="dk1"/>
@@ -1121,7 +1093,7 @@
                 <a:cs typeface="Cabin"/>
                 <a:sym typeface="Cabin"/>
               </a:rPr>
-              <a:t>WE CHOSE TO DO IT THIS WAY</a:t>
+              <a:t>WHY WE CHOSE TO DO IT THIS WAY</a:t>
             </a:r>
           </a:p>
           <a:p>
@@ -1392,10 +1364,9 @@
           <a:lstStyle/>
           <a:p>
             <a:r>
-              <a:rPr lang="en-CA" dirty="0" smtClean="0"/>
+              <a:rPr lang="en-CA" dirty="0"/>
               <a:t>READER:  Zach</a:t>
             </a:r>
-            <a:endParaRPr lang="en-CA" dirty="0"/>
           </a:p>
         </p:txBody>
       </p:sp>
@@ -1488,11 +1459,11 @@
               <a:buNone/>
             </a:pPr>
             <a:r>
-              <a:rPr lang="en-CA" dirty="0" smtClean="0"/>
+              <a:rPr lang="en-CA" dirty="0"/>
               <a:t>READER:  </a:t>
             </a:r>
             <a:r>
-              <a:rPr lang="en-CA" dirty="0" err="1" smtClean="0"/>
+              <a:rPr lang="en-CA" dirty="0" err="1"/>
               <a:t>JEan</a:t>
             </a:r>
             <a:endParaRPr dirty="0"/>
@@ -1598,11 +1569,11 @@
           <a:lstStyle/>
           <a:p>
             <a:r>
-              <a:rPr lang="en-CA" dirty="0" smtClean="0"/>
+              <a:rPr lang="en-CA" dirty="0"/>
               <a:t>READER:</a:t>
             </a:r>
             <a:r>
-              <a:rPr lang="en-CA" baseline="0" dirty="0" smtClean="0"/>
+              <a:rPr lang="en-CA" baseline="0" dirty="0"/>
               <a:t> Jean</a:t>
             </a:r>
             <a:endParaRPr lang="en-CA" dirty="0"/>
@@ -1705,7 +1676,7 @@
               <a:buNone/>
             </a:pPr>
             <a:r>
-              <a:rPr lang="en-CA" sz="2000" dirty="0" smtClean="0">
+              <a:rPr lang="en-CA" sz="2000" dirty="0">
                 <a:solidFill>
                   <a:schemeClr val="dk2"/>
                 </a:solidFill>
@@ -1731,7 +1702,7 @@
               <a:buSzPct val="100000"/>
               <a:buChar char="-"/>
             </a:pPr>
-            <a:endParaRPr lang="en-CA" sz="2000" dirty="0" smtClean="0">
+            <a:endParaRPr lang="en-CA" sz="2000" dirty="0">
               <a:solidFill>
                 <a:schemeClr val="dk2"/>
               </a:solidFill>
@@ -1756,18 +1727,6 @@
               <a:buChar char="-"/>
             </a:pPr>
             <a:r>
-              <a:rPr lang="en-CA" sz="2000" dirty="0" smtClean="0">
-                <a:solidFill>
-                  <a:schemeClr val="dk2"/>
-                </a:solidFill>
-                <a:latin typeface="Cabin"/>
-                <a:ea typeface="Cabin"/>
-                <a:cs typeface="Cabin"/>
-                <a:sym typeface="Cabin"/>
-              </a:rPr>
-              <a:t>FOR </a:t>
-            </a:r>
-            <a:r>
               <a:rPr lang="en-CA" sz="2000" dirty="0">
                 <a:solidFill>
                   <a:schemeClr val="dk2"/>
@@ -1777,7 +1736,7 @@
                 <a:cs typeface="Cabin"/>
                 <a:sym typeface="Cabin"/>
               </a:rPr>
-              <a:t>FUTURE USE: (is capable of detecting non autonomous vehicles and pedestrians &amp; Smart Traffic)</a:t>
+              <a:t>FOR FUTURE USE: (is capable of detecting non autonomous vehicles and pedestrians &amp; Smart Traffic)</a:t>
             </a:r>
           </a:p>
           <a:p>
@@ -1787,7 +1746,7 @@
               </a:spcBef>
               <a:buNone/>
             </a:pPr>
-            <a:endParaRPr lang="en-CA" dirty="0" smtClean="0"/>
+            <a:endParaRPr lang="en-CA" dirty="0"/>
           </a:p>
           <a:p>
             <a:pPr lvl="0">
@@ -1907,7 +1866,7 @@
               <a:buNone/>
             </a:pPr>
             <a:r>
-              <a:rPr lang="en-CA" dirty="0" smtClean="0"/>
+              <a:rPr lang="en-CA" dirty="0"/>
               <a:t>Costs: Radhika</a:t>
             </a:r>
             <a:endParaRPr dirty="0"/>
@@ -2021,10 +1980,9 @@
               <a:buNone/>
             </a:pPr>
             <a:r>
-              <a:rPr lang="en-CA" dirty="0" smtClean="0"/>
+              <a:rPr lang="en-CA" dirty="0"/>
               <a:t>READER: Justin</a:t>
             </a:r>
-            <a:endParaRPr lang="en-CA" dirty="0"/>
           </a:p>
         </p:txBody>
       </p:sp>
@@ -3293,7 +3251,7 @@
           <a:p>
             <a:fld id="{2FFE84A0-83F7-4E0A-A0CE-A961D6AAB2B6}" type="datetimeFigureOut">
               <a:rPr lang="en-US" smtClean="0"/>
-              <a:t>2/13/2017</a:t>
+              <a:t>2/14/2017</a:t>
             </a:fld>
             <a:endParaRPr lang="en-US" dirty="0"/>
           </a:p>
@@ -3531,7 +3489,7 @@
           <a:p>
             <a:fld id="{2FFE84A0-83F7-4E0A-A0CE-A961D6AAB2B6}" type="datetimeFigureOut">
               <a:rPr lang="en-US" smtClean="0"/>
-              <a:t>2/13/2017</a:t>
+              <a:t>2/14/2017</a:t>
             </a:fld>
             <a:endParaRPr lang="en-US" dirty="0"/>
           </a:p>
@@ -3711,7 +3669,7 @@
           <a:p>
             <a:fld id="{2FFE84A0-83F7-4E0A-A0CE-A961D6AAB2B6}" type="datetimeFigureOut">
               <a:rPr lang="en-US" smtClean="0"/>
-              <a:t>2/13/2017</a:t>
+              <a:t>2/14/2017</a:t>
             </a:fld>
             <a:endParaRPr lang="en-US" dirty="0"/>
           </a:p>
@@ -3881,7 +3839,7 @@
           <a:p>
             <a:fld id="{2FFE84A0-83F7-4E0A-A0CE-A961D6AAB2B6}" type="datetimeFigureOut">
               <a:rPr lang="en-US" smtClean="0"/>
-              <a:t>2/13/2017</a:t>
+              <a:t>2/14/2017</a:t>
             </a:fld>
             <a:endParaRPr lang="en-US" dirty="0"/>
           </a:p>
@@ -4157,7 +4115,7 @@
           <a:p>
             <a:fld id="{2FFE84A0-83F7-4E0A-A0CE-A961D6AAB2B6}" type="datetimeFigureOut">
               <a:rPr lang="en-US" smtClean="0"/>
-              <a:t>2/13/2017</a:t>
+              <a:t>2/14/2017</a:t>
             </a:fld>
             <a:endParaRPr lang="en-US" dirty="0"/>
           </a:p>
@@ -5358,7 +5316,7 @@
           <a:p>
             <a:fld id="{2FFE84A0-83F7-4E0A-A0CE-A961D6AAB2B6}" type="datetimeFigureOut">
               <a:rPr lang="en-US" smtClean="0"/>
-              <a:t>2/13/2017</a:t>
+              <a:t>2/14/2017</a:t>
             </a:fld>
             <a:endParaRPr lang="en-US" dirty="0"/>
           </a:p>
@@ -5748,7 +5706,7 @@
           <a:p>
             <a:fld id="{2FFE84A0-83F7-4E0A-A0CE-A961D6AAB2B6}" type="datetimeFigureOut">
               <a:rPr lang="en-US" smtClean="0"/>
-              <a:t>2/13/2017</a:t>
+              <a:t>2/14/2017</a:t>
             </a:fld>
             <a:endParaRPr lang="en-US" dirty="0"/>
           </a:p>
@@ -5871,7 +5829,7 @@
           <a:p>
             <a:fld id="{2FFE84A0-83F7-4E0A-A0CE-A961D6AAB2B6}" type="datetimeFigureOut">
               <a:rPr lang="en-US" smtClean="0"/>
-              <a:t>2/13/2017</a:t>
+              <a:t>2/14/2017</a:t>
             </a:fld>
             <a:endParaRPr lang="en-US" dirty="0"/>
           </a:p>
@@ -5966,7 +5924,7 @@
           <a:p>
             <a:fld id="{2FFE84A0-83F7-4E0A-A0CE-A961D6AAB2B6}" type="datetimeFigureOut">
               <a:rPr lang="en-US" smtClean="0"/>
-              <a:t>2/13/2017</a:t>
+              <a:t>2/14/2017</a:t>
             </a:fld>
             <a:endParaRPr lang="en-US" dirty="0"/>
           </a:p>
@@ -6729,7 +6687,7 @@
           <a:p>
             <a:fld id="{2FFE84A0-83F7-4E0A-A0CE-A961D6AAB2B6}" type="datetimeFigureOut">
               <a:rPr lang="en-US" smtClean="0"/>
-              <a:t>2/13/2017</a:t>
+              <a:t>2/14/2017</a:t>
             </a:fld>
             <a:endParaRPr lang="en-US" dirty="0"/>
           </a:p>
@@ -7568,7 +7526,7 @@
           <a:p>
             <a:fld id="{2FFE84A0-83F7-4E0A-A0CE-A961D6AAB2B6}" type="datetimeFigureOut">
               <a:rPr lang="en-US" smtClean="0"/>
-              <a:t>2/13/2017</a:t>
+              <a:t>2/14/2017</a:t>
             </a:fld>
             <a:endParaRPr lang="en-US" dirty="0"/>
           </a:p>
@@ -7795,7 +7753,7 @@
           <a:p>
             <a:fld id="{2FFE84A0-83F7-4E0A-A0CE-A961D6AAB2B6}" type="datetimeFigureOut">
               <a:rPr lang="en-US" smtClean="0"/>
-              <a:t>2/13/2017</a:t>
+              <a:t>2/14/2017</a:t>
             </a:fld>
             <a:endParaRPr lang="en-US" dirty="0"/>
           </a:p>
@@ -8803,7 +8761,7 @@
           <p:nvPr>
             <p:extLst>
               <p:ext uri="{386F3935-93C4-4BCD-93E2-E3B085C9AB24}">
-                <p16:designElem xmlns:p16="http://schemas.microsoft.com/office/powerpoint/2015/main" xmlns="" val="1"/>
+                <p16:designElem xmlns:p16="http://schemas.microsoft.com/office/powerpoint/2015/main" val="1"/>
               </p:ext>
             </p:extLst>
           </p:nvPr>
@@ -8953,7 +8911,7 @@
           <p:nvPr>
             <p:extLst>
               <p:ext uri="{386F3935-93C4-4BCD-93E2-E3B085C9AB24}">
-                <p16:designElem xmlns:p16="http://schemas.microsoft.com/office/powerpoint/2015/main" xmlns="" val="1"/>
+                <p16:designElem xmlns:p16="http://schemas.microsoft.com/office/powerpoint/2015/main" val="1"/>
               </p:ext>
             </p:extLst>
           </p:nvPr>
@@ -9425,7 +9383,7 @@
           <p:nvPr>
             <p:extLst>
               <p:ext uri="{386F3935-93C4-4BCD-93E2-E3B085C9AB24}">
-                <p16:designElem xmlns:p16="http://schemas.microsoft.com/office/powerpoint/2015/main" xmlns="" val="1"/>
+                <p16:designElem xmlns:p16="http://schemas.microsoft.com/office/powerpoint/2015/main" val="1"/>
               </p:ext>
             </p:extLst>
           </p:nvPr>
@@ -10938,7 +10896,7 @@
           <p:nvPr>
             <p:extLst>
               <p:ext uri="{386F3935-93C4-4BCD-93E2-E3B085C9AB24}">
-                <p16:designElem xmlns:p16="http://schemas.microsoft.com/office/powerpoint/2015/main" xmlns="" val="1"/>
+                <p16:designElem xmlns:p16="http://schemas.microsoft.com/office/powerpoint/2015/main" val="1"/>
               </p:ext>
             </p:extLst>
           </p:nvPr>
@@ -10966,7 +10924,7 @@
           <p:nvPr>
             <p:extLst>
               <p:ext uri="{386F3935-93C4-4BCD-93E2-E3B085C9AB24}">
-                <p16:designElem xmlns:p16="http://schemas.microsoft.com/office/powerpoint/2015/main" xmlns="" val="1"/>
+                <p16:designElem xmlns:p16="http://schemas.microsoft.com/office/powerpoint/2015/main" val="1"/>
               </p:ext>
             </p:extLst>
           </p:nvPr>
@@ -12020,7 +11978,7 @@
           <p:nvPr>
             <p:extLst>
               <p:ext uri="{386F3935-93C4-4BCD-93E2-E3B085C9AB24}">
-                <p16:designElem xmlns:p16="http://schemas.microsoft.com/office/powerpoint/2015/main" xmlns="" val="1"/>
+                <p16:designElem xmlns:p16="http://schemas.microsoft.com/office/powerpoint/2015/main" val="1"/>
               </p:ext>
             </p:extLst>
           </p:nvPr>
@@ -12066,7 +12024,7 @@
           <p:nvPr>
             <p:extLst>
               <p:ext uri="{386F3935-93C4-4BCD-93E2-E3B085C9AB24}">
-                <p16:designElem xmlns:p16="http://schemas.microsoft.com/office/powerpoint/2015/main" xmlns="" val="1"/>
+                <p16:designElem xmlns:p16="http://schemas.microsoft.com/office/powerpoint/2015/main" val="1"/>
               </p:ext>
             </p:extLst>
           </p:nvPr>
@@ -12216,7 +12174,7 @@
           <p:nvPr>
             <p:extLst>
               <p:ext uri="{386F3935-93C4-4BCD-93E2-E3B085C9AB24}">
-                <p16:designElem xmlns:p16="http://schemas.microsoft.com/office/powerpoint/2015/main" xmlns="" val="1"/>
+                <p16:designElem xmlns:p16="http://schemas.microsoft.com/office/powerpoint/2015/main" val="1"/>
               </p:ext>
             </p:extLst>
           </p:nvPr>
@@ -13404,7 +13362,7 @@
           <a:p>
             <a:pPr algn="ctr"/>
             <a:r>
-              <a:rPr lang="en-CA" sz="6000" dirty="0" smtClean="0">
+              <a:rPr lang="en-CA" sz="6000" dirty="0">
                 <a:solidFill>
                   <a:srgbClr val="2A1A00"/>
                 </a:solidFill>
@@ -13902,7 +13860,7 @@
           <p:nvPr>
             <p:extLst>
               <p:ext uri="{386F3935-93C4-4BCD-93E2-E3B085C9AB24}">
-                <p16:designElem xmlns:p16="http://schemas.microsoft.com/office/powerpoint/2015/main" xmlns="" val="1"/>
+                <p16:designElem xmlns:p16="http://schemas.microsoft.com/office/powerpoint/2015/main" val="1"/>
               </p:ext>
             </p:extLst>
           </p:nvPr>
@@ -13956,7 +13914,7 @@
           <p:nvPr>
             <p:extLst>
               <p:ext uri="{386F3935-93C4-4BCD-93E2-E3B085C9AB24}">
-                <p16:designElem xmlns:p16="http://schemas.microsoft.com/office/powerpoint/2015/main" xmlns="" val="1"/>
+                <p16:designElem xmlns:p16="http://schemas.microsoft.com/office/powerpoint/2015/main" val="1"/>
               </p:ext>
             </p:extLst>
           </p:nvPr>
@@ -14049,7 +14007,7 @@
           <p:nvPr>
             <p:extLst>
               <p:ext uri="{386F3935-93C4-4BCD-93E2-E3B085C9AB24}">
-                <p16:designElem xmlns:p16="http://schemas.microsoft.com/office/powerpoint/2015/main" xmlns="" val="1"/>
+                <p16:designElem xmlns:p16="http://schemas.microsoft.com/office/powerpoint/2015/main" val="1"/>
               </p:ext>
             </p:extLst>
           </p:nvPr>
@@ -18175,10 +18133,9 @@
           <a:lstStyle/>
           <a:p>
             <a:r>
-              <a:rPr lang="en-CA" dirty="0" smtClean="0"/>
+              <a:rPr lang="en-CA" dirty="0"/>
               <a:t>PICTURES HERE!!! (jean will put pictures here)</a:t>
             </a:r>
-            <a:endParaRPr lang="en-CA" dirty="0"/>
           </a:p>
         </p:txBody>
       </p:sp>
@@ -18357,7 +18314,7 @@
         <p:spPr>
           <a:xfrm>
             <a:off x="1576252" y="1776549"/>
-            <a:ext cx="8656320" cy="3170099"/>
+            <a:ext cx="8656320" cy="3477875"/>
           </a:xfrm>
           <a:prstGeom prst="rect">
             <a:avLst/>
@@ -18371,83 +18328,68 @@
           <a:lstStyle/>
           <a:p>
             <a:r>
-              <a:rPr lang="en-CA" sz="2000" b="1" dirty="0" smtClean="0"/>
+              <a:rPr lang="en-CA" sz="2000" b="1" dirty="0"/>
               <a:t>Two Modes</a:t>
             </a:r>
           </a:p>
           <a:p>
             <a:r>
               <a:rPr lang="en-CA" sz="2000" dirty="0"/>
+              <a:t>	1. Smart Intersection</a:t>
+            </a:r>
+          </a:p>
+          <a:p>
+            <a:r>
+              <a:rPr lang="en-CA" sz="2000" dirty="0"/>
+              <a:t>		- Car does not stop at intersection if not needed</a:t>
+            </a:r>
+            <a:br>
+              <a:rPr lang="en-CA" sz="2000" dirty="0"/>
+            </a:br>
+            <a:endParaRPr lang="en-CA" sz="2000" dirty="0"/>
+          </a:p>
+          <a:p>
+            <a:r>
+              <a:rPr lang="en-CA" sz="2000" dirty="0"/>
+              <a:t>       2. Normal Intersection</a:t>
+            </a:r>
+          </a:p>
+          <a:p>
+            <a:r>
+              <a:rPr lang="en-CA" sz="2000" dirty="0"/>
+              <a:t>		- Car stops at intersection, proceeds when allowed</a:t>
+            </a:r>
+          </a:p>
+          <a:p>
+            <a:endParaRPr lang="en-CA" sz="2000" b="1" dirty="0"/>
+          </a:p>
+          <a:p>
+            <a:r>
+              <a:rPr lang="en-CA" sz="2000" b="1" dirty="0"/>
+              <a:t>Intersection Monitoring and Safety</a:t>
+            </a:r>
+          </a:p>
+          <a:p>
+            <a:r>
+              <a:rPr lang="en-CA" sz="2000" b="1" dirty="0"/>
               <a:t>	</a:t>
             </a:r>
             <a:r>
-              <a:rPr lang="en-CA" sz="2000" dirty="0" smtClean="0"/>
-              <a:t>1. Smart Intersection</a:t>
+              <a:rPr lang="en-CA" sz="2000" dirty="0"/>
+              <a:t>- Camera tracks all movement in intersection</a:t>
             </a:r>
           </a:p>
           <a:p>
             <a:r>
               <a:rPr lang="en-CA" sz="2000" dirty="0"/>
-              <a:t>	</a:t>
+              <a:t>	- Redundancy in object detection</a:t>
             </a:r>
-            <a:r>
-              <a:rPr lang="en-CA" sz="2000" dirty="0" smtClean="0"/>
-              <a:t>	- car does not stop at intersection if it not needed</a:t>
-            </a:r>
-            <a:br>
-              <a:rPr lang="en-CA" sz="2000" dirty="0" smtClean="0"/>
-            </a:br>
-            <a:endParaRPr lang="en-CA" sz="2000" dirty="0" smtClean="0"/>
           </a:p>
           <a:p>
             <a:r>
               <a:rPr lang="en-CA" sz="2000" dirty="0"/>
-              <a:t> </a:t>
+              <a:t>	- Cars stop and wait at intersection by default</a:t>
             </a:r>
-            <a:r>
-              <a:rPr lang="en-CA" sz="2000" dirty="0" smtClean="0"/>
-              <a:t>      2. Normal Intersection</a:t>
-            </a:r>
-          </a:p>
-          <a:p>
-            <a:r>
-              <a:rPr lang="en-CA" sz="2000" dirty="0"/>
-              <a:t>	</a:t>
-            </a:r>
-            <a:r>
-              <a:rPr lang="en-CA" sz="2000" dirty="0" smtClean="0"/>
-              <a:t>	- car stops at  intersection, proceeds when allowed</a:t>
-            </a:r>
-          </a:p>
-          <a:p>
-            <a:endParaRPr lang="en-CA" sz="2000" b="1" dirty="0"/>
-          </a:p>
-          <a:p>
-            <a:r>
-              <a:rPr lang="en-CA" sz="2000" b="1" dirty="0" smtClean="0"/>
-              <a:t>Intersection Monitoring</a:t>
-            </a:r>
-          </a:p>
-          <a:p>
-            <a:r>
-              <a:rPr lang="en-CA" sz="2000" b="1" dirty="0" smtClean="0"/>
-              <a:t>	</a:t>
-            </a:r>
-            <a:r>
-              <a:rPr lang="en-CA" sz="2000" dirty="0" smtClean="0"/>
-              <a:t>- Camera tracks all movement in intersection</a:t>
-            </a:r>
-          </a:p>
-          <a:p>
-            <a:r>
-              <a:rPr lang="en-CA" sz="2000" dirty="0"/>
-              <a:t>	</a:t>
-            </a:r>
-            <a:r>
-              <a:rPr lang="en-CA" sz="2000" dirty="0" smtClean="0"/>
-              <a:t>- Redundancy in object detection</a:t>
-            </a:r>
-            <a:endParaRPr lang="en-CA" sz="2000" dirty="0"/>
           </a:p>
         </p:txBody>
       </p:sp>
@@ -18461,13 +18403,6 @@
   <p:clrMapOvr>
     <a:masterClrMapping/>
   </p:clrMapOvr>
-  <p:timing>
-    <p:tnLst>
-      <p:par>
-        <p:cTn id="1" dur="indefinite" restart="never" nodeType="tmRoot"/>
-      </p:par>
-    </p:tnLst>
-  </p:timing>
 </p:sld>
 </file>
 
@@ -18566,28 +18501,28 @@
                 <a:gridCol w="2576675">
                   <a:extLst>
                     <a:ext uri="{9D8B030D-6E8A-4147-A177-3AD203B41FA5}">
-                      <a16:colId xmlns:a16="http://schemas.microsoft.com/office/drawing/2014/main" xmlns="" val="20000"/>
+                      <a16:colId xmlns:a16="http://schemas.microsoft.com/office/drawing/2014/main" val="20000"/>
                     </a:ext>
                   </a:extLst>
                 </a:gridCol>
                 <a:gridCol w="2576675">
                   <a:extLst>
                     <a:ext uri="{9D8B030D-6E8A-4147-A177-3AD203B41FA5}">
-                      <a16:colId xmlns:a16="http://schemas.microsoft.com/office/drawing/2014/main" xmlns="" val="20001"/>
+                      <a16:colId xmlns:a16="http://schemas.microsoft.com/office/drawing/2014/main" val="20001"/>
                     </a:ext>
                   </a:extLst>
                 </a:gridCol>
                 <a:gridCol w="2576675">
                   <a:extLst>
                     <a:ext uri="{9D8B030D-6E8A-4147-A177-3AD203B41FA5}">
-                      <a16:colId xmlns:a16="http://schemas.microsoft.com/office/drawing/2014/main" xmlns="" val="20002"/>
+                      <a16:colId xmlns:a16="http://schemas.microsoft.com/office/drawing/2014/main" val="20002"/>
                     </a:ext>
                   </a:extLst>
                 </a:gridCol>
                 <a:gridCol w="1578550">
                   <a:extLst>
                     <a:ext uri="{9D8B030D-6E8A-4147-A177-3AD203B41FA5}">
-                      <a16:colId xmlns:a16="http://schemas.microsoft.com/office/drawing/2014/main" xmlns="" val="20003"/>
+                      <a16:colId xmlns:a16="http://schemas.microsoft.com/office/drawing/2014/main" val="20003"/>
                     </a:ext>
                   </a:extLst>
                 </a:gridCol>
@@ -18671,7 +18606,7 @@
                 </a:tc>
                 <a:extLst>
                   <a:ext uri="{0D108BD9-81ED-4DB2-BD59-A6C34878D82A}">
-                    <a16:rowId xmlns:a16="http://schemas.microsoft.com/office/drawing/2014/main" xmlns="" val="10000"/>
+                    <a16:rowId xmlns:a16="http://schemas.microsoft.com/office/drawing/2014/main" val="10000"/>
                   </a:ext>
                 </a:extLst>
               </a:tr>
@@ -18766,7 +18701,7 @@
                 </a:tc>
                 <a:extLst>
                   <a:ext uri="{0D108BD9-81ED-4DB2-BD59-A6C34878D82A}">
-                    <a16:rowId xmlns:a16="http://schemas.microsoft.com/office/drawing/2014/main" xmlns="" val="10001"/>
+                    <a16:rowId xmlns:a16="http://schemas.microsoft.com/office/drawing/2014/main" val="10001"/>
                   </a:ext>
                 </a:extLst>
               </a:tr>
@@ -18858,7 +18793,7 @@
                 </a:tc>
                 <a:extLst>
                   <a:ext uri="{0D108BD9-81ED-4DB2-BD59-A6C34878D82A}">
-                    <a16:rowId xmlns:a16="http://schemas.microsoft.com/office/drawing/2014/main" xmlns="" val="10002"/>
+                    <a16:rowId xmlns:a16="http://schemas.microsoft.com/office/drawing/2014/main" val="10002"/>
                   </a:ext>
                 </a:extLst>
               </a:tr>
@@ -18941,7 +18876,7 @@
                 </a:tc>
                 <a:extLst>
                   <a:ext uri="{0D108BD9-81ED-4DB2-BD59-A6C34878D82A}">
-                    <a16:rowId xmlns:a16="http://schemas.microsoft.com/office/drawing/2014/main" xmlns="" val="10003"/>
+                    <a16:rowId xmlns:a16="http://schemas.microsoft.com/office/drawing/2014/main" val="10003"/>
                   </a:ext>
                 </a:extLst>
               </a:tr>
@@ -19024,7 +18959,7 @@
                 </a:tc>
                 <a:extLst>
                   <a:ext uri="{0D108BD9-81ED-4DB2-BD59-A6C34878D82A}">
-                    <a16:rowId xmlns:a16="http://schemas.microsoft.com/office/drawing/2014/main" xmlns="" val="10004"/>
+                    <a16:rowId xmlns:a16="http://schemas.microsoft.com/office/drawing/2014/main" val="10004"/>
                   </a:ext>
                 </a:extLst>
               </a:tr>
@@ -19107,7 +19042,7 @@
                 </a:tc>
                 <a:extLst>
                   <a:ext uri="{0D108BD9-81ED-4DB2-BD59-A6C34878D82A}">
-                    <a16:rowId xmlns:a16="http://schemas.microsoft.com/office/drawing/2014/main" xmlns="" val="10005"/>
+                    <a16:rowId xmlns:a16="http://schemas.microsoft.com/office/drawing/2014/main" val="10005"/>
                   </a:ext>
                 </a:extLst>
               </a:tr>
@@ -19190,7 +19125,7 @@
                 </a:tc>
                 <a:extLst>
                   <a:ext uri="{0D108BD9-81ED-4DB2-BD59-A6C34878D82A}">
-                    <a16:rowId xmlns:a16="http://schemas.microsoft.com/office/drawing/2014/main" xmlns="" val="10006"/>
+                    <a16:rowId xmlns:a16="http://schemas.microsoft.com/office/drawing/2014/main" val="10006"/>
                   </a:ext>
                 </a:extLst>
               </a:tr>
@@ -19246,13 +19181,6 @@
   <p:clrMapOvr>
     <a:masterClrMapping/>
   </p:clrMapOvr>
-  <p:timing>
-    <p:tnLst>
-      <p:par>
-        <p:cTn id="1" dur="indefinite" restart="never" nodeType="tmRoot"/>
-      </p:par>
-    </p:tnLst>
-  </p:timing>
 </p:sld>
 </file>
 

</xml_diff>